<commit_message>
adding some beginning info
</commit_message>
<xml_diff>
--- a/SQL Injection Prevention.pptx
+++ b/SQL Injection Prevention.pptx
@@ -6,6 +6,12 @@
   </p:sldMasterIdLst>
   <p:sldIdLst>
     <p:sldId id="256" r:id="rId2"/>
+    <p:sldId id="257" r:id="rId3"/>
+    <p:sldId id="258" r:id="rId4"/>
+    <p:sldId id="259" r:id="rId5"/>
+    <p:sldId id="260" r:id="rId6"/>
+    <p:sldId id="261" r:id="rId7"/>
+    <p:sldId id="262" r:id="rId8"/>
   </p:sldIdLst>
   <p:sldSz cx="12192000" cy="6858000"/>
   <p:notesSz cx="6858000" cy="9144000"/>
@@ -104,6 +110,11 @@
       </a:defRPr>
     </a:lvl9pPr>
   </p:defaultTextStyle>
+  <p:extLst>
+    <p:ext uri="{EFAFB233-063F-42B5-8137-9DF3F51BA10A}">
+      <p15:sldGuideLst xmlns:p15="http://schemas.microsoft.com/office/powerpoint/2012/main"/>
+    </p:ext>
+  </p:extLst>
 </p:presentation>
 </file>
 
@@ -3411,6 +3422,616 @@
 </p:sld>
 </file>
 
+<file path=ppt/slides/slide2.xml><?xml version="1.0" encoding="utf-8"?>
+<p:sld xmlns:a="http://schemas.openxmlformats.org/drawingml/2006/main" xmlns:r="http://schemas.openxmlformats.org/officeDocument/2006/relationships" xmlns:p="http://schemas.openxmlformats.org/presentationml/2006/main">
+  <p:cSld>
+    <p:spTree>
+      <p:nvGrpSpPr>
+        <p:cNvPr id="1" name=""/>
+        <p:cNvGrpSpPr/>
+        <p:nvPr/>
+      </p:nvGrpSpPr>
+      <p:grpSpPr>
+        <a:xfrm>
+          <a:off x="0" y="0"/>
+          <a:ext cx="0" cy="0"/>
+          <a:chOff x="0" y="0"/>
+          <a:chExt cx="0" cy="0"/>
+        </a:xfrm>
+      </p:grpSpPr>
+      <p:sp>
+        <p:nvSpPr>
+          <p:cNvPr id="2" name="Title 1">
+            <a:extLst>
+              <a:ext uri="{FF2B5EF4-FFF2-40B4-BE49-F238E27FC236}">
+                <a16:creationId xmlns:a16="http://schemas.microsoft.com/office/drawing/2014/main" id="{C5827663-5643-4B0F-B739-28451E176AF5}"/>
+              </a:ext>
+            </a:extLst>
+          </p:cNvPr>
+          <p:cNvSpPr>
+            <a:spLocks noGrp="1"/>
+          </p:cNvSpPr>
+          <p:nvPr>
+            <p:ph type="title"/>
+          </p:nvPr>
+        </p:nvSpPr>
+        <p:spPr/>
+        <p:txBody>
+          <a:bodyPr/>
+          <a:lstStyle/>
+          <a:p>
+            <a:r>
+              <a:rPr lang="en-CA" dirty="0"/>
+              <a:t>Creation of Test Database</a:t>
+            </a:r>
+          </a:p>
+        </p:txBody>
+      </p:sp>
+      <p:sp>
+        <p:nvSpPr>
+          <p:cNvPr id="3" name="Content Placeholder 2">
+            <a:extLst>
+              <a:ext uri="{FF2B5EF4-FFF2-40B4-BE49-F238E27FC236}">
+                <a16:creationId xmlns:a16="http://schemas.microsoft.com/office/drawing/2014/main" id="{62103D5D-3B1F-4F3E-806F-FAE2B5F03738}"/>
+              </a:ext>
+            </a:extLst>
+          </p:cNvPr>
+          <p:cNvSpPr>
+            <a:spLocks noGrp="1"/>
+          </p:cNvSpPr>
+          <p:nvPr>
+            <p:ph idx="1"/>
+          </p:nvPr>
+        </p:nvSpPr>
+        <p:spPr>
+          <a:xfrm>
+            <a:off x="829112" y="1800458"/>
+            <a:ext cx="10515600" cy="4351338"/>
+          </a:xfrm>
+        </p:spPr>
+        <p:txBody>
+          <a:bodyPr>
+            <a:normAutofit/>
+          </a:bodyPr>
+          <a:lstStyle/>
+          <a:p>
+            <a:r>
+              <a:rPr lang="en-CA" dirty="0"/>
+              <a:t>The test database is a simplified version of a database that you might find at a school.</a:t>
+            </a:r>
+          </a:p>
+          <a:p>
+            <a:r>
+              <a:rPr lang="en-CA" dirty="0"/>
+              <a:t>It contains three tables:</a:t>
+            </a:r>
+          </a:p>
+          <a:p>
+            <a:pPr marL="914400" lvl="1" indent="-457200">
+              <a:buFont typeface="+mj-lt"/>
+              <a:buAutoNum type="arabicPeriod"/>
+            </a:pPr>
+            <a:r>
+              <a:rPr lang="en-CA" dirty="0"/>
+              <a:t>A table with student information</a:t>
+            </a:r>
+          </a:p>
+          <a:p>
+            <a:pPr marL="914400" lvl="1" indent="-457200">
+              <a:buFont typeface="+mj-lt"/>
+              <a:buAutoNum type="arabicPeriod"/>
+            </a:pPr>
+            <a:r>
+              <a:rPr lang="en-CA" dirty="0"/>
+              <a:t>A table with faculty information</a:t>
+            </a:r>
+          </a:p>
+          <a:p>
+            <a:pPr marL="914400" lvl="1" indent="-457200">
+              <a:buFont typeface="+mj-lt"/>
+              <a:buAutoNum type="arabicPeriod"/>
+            </a:pPr>
+            <a:r>
+              <a:rPr lang="en-CA" dirty="0"/>
+              <a:t>A table with course information</a:t>
+            </a:r>
+          </a:p>
+          <a:p>
+            <a:r>
+              <a:rPr lang="en-CA" dirty="0"/>
+              <a:t>I used WAMP and </a:t>
+            </a:r>
+            <a:r>
+              <a:rPr lang="en-CA" dirty="0" err="1"/>
+              <a:t>MyPHPAdmin</a:t>
+            </a:r>
+            <a:r>
+              <a:rPr lang="en-CA" dirty="0"/>
+              <a:t> to be able to see and manipulate the database.</a:t>
+            </a:r>
+          </a:p>
+          <a:p>
+            <a:endParaRPr lang="en-CA" dirty="0"/>
+          </a:p>
+          <a:p>
+            <a:pPr marL="457200" lvl="1" indent="0">
+              <a:buNone/>
+            </a:pPr>
+            <a:endParaRPr lang="en-CA" dirty="0"/>
+          </a:p>
+          <a:p>
+            <a:pPr marL="457200" lvl="1" indent="0">
+              <a:buNone/>
+            </a:pPr>
+            <a:endParaRPr lang="en-CA" dirty="0"/>
+          </a:p>
+        </p:txBody>
+      </p:sp>
+    </p:spTree>
+    <p:extLst>
+      <p:ext uri="{BB962C8B-B14F-4D97-AF65-F5344CB8AC3E}">
+        <p14:creationId xmlns:p14="http://schemas.microsoft.com/office/powerpoint/2010/main" val="1678913944"/>
+      </p:ext>
+    </p:extLst>
+  </p:cSld>
+  <p:clrMapOvr>
+    <a:masterClrMapping/>
+  </p:clrMapOvr>
+</p:sld>
+</file>
+
+<file path=ppt/slides/slide3.xml><?xml version="1.0" encoding="utf-8"?>
+<p:sld xmlns:a="http://schemas.openxmlformats.org/drawingml/2006/main" xmlns:r="http://schemas.openxmlformats.org/officeDocument/2006/relationships" xmlns:p="http://schemas.openxmlformats.org/presentationml/2006/main">
+  <p:cSld>
+    <p:spTree>
+      <p:nvGrpSpPr>
+        <p:cNvPr id="1" name=""/>
+        <p:cNvGrpSpPr/>
+        <p:nvPr/>
+      </p:nvGrpSpPr>
+      <p:grpSpPr>
+        <a:xfrm>
+          <a:off x="0" y="0"/>
+          <a:ext cx="0" cy="0"/>
+          <a:chOff x="0" y="0"/>
+          <a:chExt cx="0" cy="0"/>
+        </a:xfrm>
+      </p:grpSpPr>
+      <p:sp>
+        <p:nvSpPr>
+          <p:cNvPr id="2" name="Title 1">
+            <a:extLst>
+              <a:ext uri="{FF2B5EF4-FFF2-40B4-BE49-F238E27FC236}">
+                <a16:creationId xmlns:a16="http://schemas.microsoft.com/office/drawing/2014/main" id="{97222B72-CC9E-4E2E-BFA2-E57980614B90}"/>
+              </a:ext>
+            </a:extLst>
+          </p:cNvPr>
+          <p:cNvSpPr>
+            <a:spLocks noGrp="1"/>
+          </p:cNvSpPr>
+          <p:nvPr>
+            <p:ph type="title"/>
+          </p:nvPr>
+        </p:nvSpPr>
+        <p:spPr/>
+        <p:txBody>
+          <a:bodyPr/>
+          <a:lstStyle/>
+          <a:p>
+            <a:r>
+              <a:rPr lang="en-CA" dirty="0"/>
+              <a:t>Initial Structure of the Database</a:t>
+            </a:r>
+          </a:p>
+        </p:txBody>
+      </p:sp>
+      <p:pic>
+        <p:nvPicPr>
+          <p:cNvPr id="5" name="Content Placeholder 4" descr="A screenshot of a cell phone&#10;&#10;Description automatically generated">
+            <a:extLst>
+              <a:ext uri="{FF2B5EF4-FFF2-40B4-BE49-F238E27FC236}">
+                <a16:creationId xmlns:a16="http://schemas.microsoft.com/office/drawing/2014/main" id="{39263666-F64C-4266-908F-D58FB570B3A5}"/>
+              </a:ext>
+            </a:extLst>
+          </p:cNvPr>
+          <p:cNvPicPr>
+            <a:picLocks noGrp="1" noChangeAspect="1"/>
+          </p:cNvPicPr>
+          <p:nvPr>
+            <p:ph idx="1"/>
+          </p:nvPr>
+        </p:nvPicPr>
+        <p:blipFill>
+          <a:blip r:embed="rId2">
+            <a:extLst>
+              <a:ext uri="{28A0092B-C50C-407E-A947-70E740481C1C}">
+                <a14:useLocalDpi xmlns:a14="http://schemas.microsoft.com/office/drawing/2010/main" val="0"/>
+              </a:ext>
+            </a:extLst>
+          </a:blip>
+          <a:stretch>
+            <a:fillRect/>
+          </a:stretch>
+        </p:blipFill>
+        <p:spPr>
+          <a:xfrm>
+            <a:off x="1756757" y="3337811"/>
+            <a:ext cx="8678486" cy="1325563"/>
+          </a:xfrm>
+        </p:spPr>
+      </p:pic>
+    </p:spTree>
+    <p:extLst>
+      <p:ext uri="{BB962C8B-B14F-4D97-AF65-F5344CB8AC3E}">
+        <p14:creationId xmlns:p14="http://schemas.microsoft.com/office/powerpoint/2010/main" val="271873066"/>
+      </p:ext>
+    </p:extLst>
+  </p:cSld>
+  <p:clrMapOvr>
+    <a:masterClrMapping/>
+  </p:clrMapOvr>
+</p:sld>
+</file>
+
+<file path=ppt/slides/slide4.xml><?xml version="1.0" encoding="utf-8"?>
+<p:sld xmlns:a="http://schemas.openxmlformats.org/drawingml/2006/main" xmlns:r="http://schemas.openxmlformats.org/officeDocument/2006/relationships" xmlns:p="http://schemas.openxmlformats.org/presentationml/2006/main">
+  <p:cSld>
+    <p:spTree>
+      <p:nvGrpSpPr>
+        <p:cNvPr id="1" name=""/>
+        <p:cNvGrpSpPr/>
+        <p:nvPr/>
+      </p:nvGrpSpPr>
+      <p:grpSpPr>
+        <a:xfrm>
+          <a:off x="0" y="0"/>
+          <a:ext cx="0" cy="0"/>
+          <a:chOff x="0" y="0"/>
+          <a:chExt cx="0" cy="0"/>
+        </a:xfrm>
+      </p:grpSpPr>
+      <p:sp>
+        <p:nvSpPr>
+          <p:cNvPr id="2" name="Title 1">
+            <a:extLst>
+              <a:ext uri="{FF2B5EF4-FFF2-40B4-BE49-F238E27FC236}">
+                <a16:creationId xmlns:a16="http://schemas.microsoft.com/office/drawing/2014/main" id="{C25D73B1-8930-4789-8D7E-981C6C660E77}"/>
+              </a:ext>
+            </a:extLst>
+          </p:cNvPr>
+          <p:cNvSpPr>
+            <a:spLocks noGrp="1"/>
+          </p:cNvSpPr>
+          <p:nvPr>
+            <p:ph type="title"/>
+          </p:nvPr>
+        </p:nvSpPr>
+        <p:spPr/>
+        <p:txBody>
+          <a:bodyPr/>
+          <a:lstStyle/>
+          <a:p>
+            <a:r>
+              <a:rPr lang="en-CA" dirty="0"/>
+              <a:t>Initial Structure of the Student Table</a:t>
+            </a:r>
+          </a:p>
+        </p:txBody>
+      </p:sp>
+      <p:pic>
+        <p:nvPicPr>
+          <p:cNvPr id="5" name="Content Placeholder 4" descr="A screenshot of a cell phone&#10;&#10;Description automatically generated">
+            <a:extLst>
+              <a:ext uri="{FF2B5EF4-FFF2-40B4-BE49-F238E27FC236}">
+                <a16:creationId xmlns:a16="http://schemas.microsoft.com/office/drawing/2014/main" id="{4FE91F42-392C-41CD-9CEA-E78E0E460CDE}"/>
+              </a:ext>
+            </a:extLst>
+          </p:cNvPr>
+          <p:cNvPicPr>
+            <a:picLocks noGrp="1" noChangeAspect="1"/>
+          </p:cNvPicPr>
+          <p:nvPr>
+            <p:ph idx="1"/>
+          </p:nvPr>
+        </p:nvPicPr>
+        <p:blipFill>
+          <a:blip r:embed="rId2">
+            <a:extLst>
+              <a:ext uri="{28A0092B-C50C-407E-A947-70E740481C1C}">
+                <a14:useLocalDpi xmlns:a14="http://schemas.microsoft.com/office/drawing/2010/main" val="0"/>
+              </a:ext>
+            </a:extLst>
+          </a:blip>
+          <a:stretch>
+            <a:fillRect/>
+          </a:stretch>
+        </p:blipFill>
+        <p:spPr>
+          <a:xfrm>
+            <a:off x="1685309" y="2110317"/>
+            <a:ext cx="8821381" cy="3781953"/>
+          </a:xfrm>
+        </p:spPr>
+      </p:pic>
+    </p:spTree>
+    <p:extLst>
+      <p:ext uri="{BB962C8B-B14F-4D97-AF65-F5344CB8AC3E}">
+        <p14:creationId xmlns:p14="http://schemas.microsoft.com/office/powerpoint/2010/main" val="1421038937"/>
+      </p:ext>
+    </p:extLst>
+  </p:cSld>
+  <p:clrMapOvr>
+    <a:masterClrMapping/>
+  </p:clrMapOvr>
+</p:sld>
+</file>
+
+<file path=ppt/slides/slide5.xml><?xml version="1.0" encoding="utf-8"?>
+<p:sld xmlns:a="http://schemas.openxmlformats.org/drawingml/2006/main" xmlns:r="http://schemas.openxmlformats.org/officeDocument/2006/relationships" xmlns:p="http://schemas.openxmlformats.org/presentationml/2006/main">
+  <p:cSld>
+    <p:spTree>
+      <p:nvGrpSpPr>
+        <p:cNvPr id="1" name=""/>
+        <p:cNvGrpSpPr/>
+        <p:nvPr/>
+      </p:nvGrpSpPr>
+      <p:grpSpPr>
+        <a:xfrm>
+          <a:off x="0" y="0"/>
+          <a:ext cx="0" cy="0"/>
+          <a:chOff x="0" y="0"/>
+          <a:chExt cx="0" cy="0"/>
+        </a:xfrm>
+      </p:grpSpPr>
+      <p:sp>
+        <p:nvSpPr>
+          <p:cNvPr id="2" name="Title 1">
+            <a:extLst>
+              <a:ext uri="{FF2B5EF4-FFF2-40B4-BE49-F238E27FC236}">
+                <a16:creationId xmlns:a16="http://schemas.microsoft.com/office/drawing/2014/main" id="{FE595236-8AAE-470B-8EF1-E0DD6246A9A4}"/>
+              </a:ext>
+            </a:extLst>
+          </p:cNvPr>
+          <p:cNvSpPr>
+            <a:spLocks noGrp="1"/>
+          </p:cNvSpPr>
+          <p:nvPr>
+            <p:ph type="title"/>
+          </p:nvPr>
+        </p:nvSpPr>
+        <p:spPr/>
+        <p:txBody>
+          <a:bodyPr/>
+          <a:lstStyle/>
+          <a:p>
+            <a:r>
+              <a:rPr lang="en-CA" dirty="0"/>
+              <a:t>Initial Structure of the Faculty Table</a:t>
+            </a:r>
+          </a:p>
+        </p:txBody>
+      </p:sp>
+      <p:pic>
+        <p:nvPicPr>
+          <p:cNvPr id="5" name="Content Placeholder 4" descr="A screenshot of a cell phone&#10;&#10;Description automatically generated">
+            <a:extLst>
+              <a:ext uri="{FF2B5EF4-FFF2-40B4-BE49-F238E27FC236}">
+                <a16:creationId xmlns:a16="http://schemas.microsoft.com/office/drawing/2014/main" id="{63F6605E-C775-439B-974E-2BD2F31F4A7A}"/>
+              </a:ext>
+            </a:extLst>
+          </p:cNvPr>
+          <p:cNvPicPr>
+            <a:picLocks noGrp="1" noChangeAspect="1"/>
+          </p:cNvPicPr>
+          <p:nvPr>
+            <p:ph idx="1"/>
+          </p:nvPr>
+        </p:nvPicPr>
+        <p:blipFill>
+          <a:blip r:embed="rId2">
+            <a:extLst>
+              <a:ext uri="{28A0092B-C50C-407E-A947-70E740481C1C}">
+                <a14:useLocalDpi xmlns:a14="http://schemas.microsoft.com/office/drawing/2010/main" val="0"/>
+              </a:ext>
+            </a:extLst>
+          </a:blip>
+          <a:stretch>
+            <a:fillRect/>
+          </a:stretch>
+        </p:blipFill>
+        <p:spPr>
+          <a:xfrm>
+            <a:off x="1875836" y="2134133"/>
+            <a:ext cx="8440328" cy="3734321"/>
+          </a:xfrm>
+        </p:spPr>
+      </p:pic>
+    </p:spTree>
+    <p:extLst>
+      <p:ext uri="{BB962C8B-B14F-4D97-AF65-F5344CB8AC3E}">
+        <p14:creationId xmlns:p14="http://schemas.microsoft.com/office/powerpoint/2010/main" val="2953429155"/>
+      </p:ext>
+    </p:extLst>
+  </p:cSld>
+  <p:clrMapOvr>
+    <a:masterClrMapping/>
+  </p:clrMapOvr>
+</p:sld>
+</file>
+
+<file path=ppt/slides/slide6.xml><?xml version="1.0" encoding="utf-8"?>
+<p:sld xmlns:a="http://schemas.openxmlformats.org/drawingml/2006/main" xmlns:r="http://schemas.openxmlformats.org/officeDocument/2006/relationships" xmlns:p="http://schemas.openxmlformats.org/presentationml/2006/main">
+  <p:cSld>
+    <p:spTree>
+      <p:nvGrpSpPr>
+        <p:cNvPr id="1" name=""/>
+        <p:cNvGrpSpPr/>
+        <p:nvPr/>
+      </p:nvGrpSpPr>
+      <p:grpSpPr>
+        <a:xfrm>
+          <a:off x="0" y="0"/>
+          <a:ext cx="0" cy="0"/>
+          <a:chOff x="0" y="0"/>
+          <a:chExt cx="0" cy="0"/>
+        </a:xfrm>
+      </p:grpSpPr>
+      <p:sp>
+        <p:nvSpPr>
+          <p:cNvPr id="2" name="Title 1">
+            <a:extLst>
+              <a:ext uri="{FF2B5EF4-FFF2-40B4-BE49-F238E27FC236}">
+                <a16:creationId xmlns:a16="http://schemas.microsoft.com/office/drawing/2014/main" id="{415DCA8C-C59C-44F3-9C41-273CD6C54E84}"/>
+              </a:ext>
+            </a:extLst>
+          </p:cNvPr>
+          <p:cNvSpPr>
+            <a:spLocks noGrp="1"/>
+          </p:cNvSpPr>
+          <p:nvPr>
+            <p:ph type="title"/>
+          </p:nvPr>
+        </p:nvSpPr>
+        <p:spPr/>
+        <p:txBody>
+          <a:bodyPr/>
+          <a:lstStyle/>
+          <a:p>
+            <a:r>
+              <a:rPr lang="en-CA" dirty="0"/>
+              <a:t>Initial Structure of the Course Table</a:t>
+            </a:r>
+          </a:p>
+        </p:txBody>
+      </p:sp>
+      <p:pic>
+        <p:nvPicPr>
+          <p:cNvPr id="5" name="Content Placeholder 4" descr="A screenshot of a cell phone&#10;&#10;Description automatically generated">
+            <a:extLst>
+              <a:ext uri="{FF2B5EF4-FFF2-40B4-BE49-F238E27FC236}">
+                <a16:creationId xmlns:a16="http://schemas.microsoft.com/office/drawing/2014/main" id="{0E6E59EE-948E-4BFD-B9EF-4B91405155A6}"/>
+              </a:ext>
+            </a:extLst>
+          </p:cNvPr>
+          <p:cNvPicPr>
+            <a:picLocks noGrp="1" noChangeAspect="1"/>
+          </p:cNvPicPr>
+          <p:nvPr>
+            <p:ph idx="1"/>
+          </p:nvPr>
+        </p:nvPicPr>
+        <p:blipFill>
+          <a:blip r:embed="rId2">
+            <a:extLst>
+              <a:ext uri="{28A0092B-C50C-407E-A947-70E740481C1C}">
+                <a14:useLocalDpi xmlns:a14="http://schemas.microsoft.com/office/drawing/2010/main" val="0"/>
+              </a:ext>
+            </a:extLst>
+          </a:blip>
+          <a:stretch>
+            <a:fillRect/>
+          </a:stretch>
+        </p:blipFill>
+        <p:spPr>
+          <a:xfrm>
+            <a:off x="1923467" y="2929582"/>
+            <a:ext cx="8345065" cy="2143424"/>
+          </a:xfrm>
+        </p:spPr>
+      </p:pic>
+    </p:spTree>
+    <p:extLst>
+      <p:ext uri="{BB962C8B-B14F-4D97-AF65-F5344CB8AC3E}">
+        <p14:creationId xmlns:p14="http://schemas.microsoft.com/office/powerpoint/2010/main" val="1790083369"/>
+      </p:ext>
+    </p:extLst>
+  </p:cSld>
+  <p:clrMapOvr>
+    <a:masterClrMapping/>
+  </p:clrMapOvr>
+</p:sld>
+</file>
+
+<file path=ppt/slides/slide7.xml><?xml version="1.0" encoding="utf-8"?>
+<p:sld xmlns:a="http://schemas.openxmlformats.org/drawingml/2006/main" xmlns:r="http://schemas.openxmlformats.org/officeDocument/2006/relationships" xmlns:p="http://schemas.openxmlformats.org/presentationml/2006/main">
+  <p:cSld>
+    <p:spTree>
+      <p:nvGrpSpPr>
+        <p:cNvPr id="1" name=""/>
+        <p:cNvGrpSpPr/>
+        <p:nvPr/>
+      </p:nvGrpSpPr>
+      <p:grpSpPr>
+        <a:xfrm>
+          <a:off x="0" y="0"/>
+          <a:ext cx="0" cy="0"/>
+          <a:chOff x="0" y="0"/>
+          <a:chExt cx="0" cy="0"/>
+        </a:xfrm>
+      </p:grpSpPr>
+      <p:sp>
+        <p:nvSpPr>
+          <p:cNvPr id="2" name="Title 1">
+            <a:extLst>
+              <a:ext uri="{FF2B5EF4-FFF2-40B4-BE49-F238E27FC236}">
+                <a16:creationId xmlns:a16="http://schemas.microsoft.com/office/drawing/2014/main" id="{4D5427DE-1A93-4490-9678-9C134615255D}"/>
+              </a:ext>
+            </a:extLst>
+          </p:cNvPr>
+          <p:cNvSpPr>
+            <a:spLocks noGrp="1"/>
+          </p:cNvSpPr>
+          <p:nvPr>
+            <p:ph type="title"/>
+          </p:nvPr>
+        </p:nvSpPr>
+        <p:spPr/>
+        <p:txBody>
+          <a:bodyPr/>
+          <a:lstStyle/>
+          <a:p>
+            <a:endParaRPr lang="en-CA"/>
+          </a:p>
+        </p:txBody>
+      </p:sp>
+      <p:sp>
+        <p:nvSpPr>
+          <p:cNvPr id="3" name="Content Placeholder 2">
+            <a:extLst>
+              <a:ext uri="{FF2B5EF4-FFF2-40B4-BE49-F238E27FC236}">
+                <a16:creationId xmlns:a16="http://schemas.microsoft.com/office/drawing/2014/main" id="{37AE8E68-F358-4B74-BFF5-D4DE72E90072}"/>
+              </a:ext>
+            </a:extLst>
+          </p:cNvPr>
+          <p:cNvSpPr>
+            <a:spLocks noGrp="1"/>
+          </p:cNvSpPr>
+          <p:nvPr>
+            <p:ph idx="1"/>
+          </p:nvPr>
+        </p:nvSpPr>
+        <p:spPr/>
+        <p:txBody>
+          <a:bodyPr/>
+          <a:lstStyle/>
+          <a:p>
+            <a:endParaRPr lang="en-CA"/>
+          </a:p>
+        </p:txBody>
+      </p:sp>
+    </p:spTree>
+    <p:extLst>
+      <p:ext uri="{BB962C8B-B14F-4D97-AF65-F5344CB8AC3E}">
+        <p14:creationId xmlns:p14="http://schemas.microsoft.com/office/powerpoint/2010/main" val="2620131991"/>
+      </p:ext>
+    </p:extLst>
+  </p:cSld>
+  <p:clrMapOvr>
+    <a:masterClrMapping/>
+  </p:clrMapOvr>
+</p:sld>
+</file>
+
 <file path=ppt/theme/theme1.xml><?xml version="1.0" encoding="utf-8"?>
 <a:theme xmlns:a="http://schemas.openxmlformats.org/drawingml/2006/main" name="Office Theme">
   <a:themeElements>

</xml_diff>

<commit_message>
small changes to powerpoint and search course
</commit_message>
<xml_diff>
--- a/SQL Injection Prevention.pptx
+++ b/SQL Injection Prevention.pptx
@@ -12,6 +12,8 @@
     <p:sldId id="260" r:id="rId6"/>
     <p:sldId id="261" r:id="rId7"/>
     <p:sldId id="262" r:id="rId8"/>
+    <p:sldId id="263" r:id="rId9"/>
+    <p:sldId id="264" r:id="rId10"/>
   </p:sldIdLst>
   <p:sldSz cx="12192000" cy="6858000"/>
   <p:notesSz cx="6858000" cy="9144000"/>
@@ -118,6 +120,121 @@
 </p:presentation>
 </file>
 
+<file path=ppt/revisionInfo.xml><?xml version="1.0" encoding="utf-8"?>
+<p1510:revInfo xmlns:a="http://schemas.openxmlformats.org/drawingml/2006/main" xmlns:r="http://schemas.openxmlformats.org/officeDocument/2006/relationships" xmlns:p1510="http://schemas.microsoft.com/office/powerpoint/2015/10/main">
+  <p1510:revLst>
+    <p1510:client id="{9C93950A-6E9A-4B9D-94B0-2756FB385F16}" v="5" dt="2019-11-23T23:08:05.194"/>
+  </p1510:revLst>
+</p1510:revInfo>
+</file>
+
+<file path=ppt/changesInfos/changesInfo1.xml><?xml version="1.0" encoding="utf-8"?>
+<pc:chgInfo xmlns:a="http://schemas.openxmlformats.org/drawingml/2006/main" xmlns:r="http://schemas.openxmlformats.org/officeDocument/2006/relationships" xmlns:ac="http://schemas.microsoft.com/office/drawing/2013/main/command" xmlns:pc="http://schemas.microsoft.com/office/powerpoint/2013/main/command">
+  <pc:docChgLst>
+    <pc:chgData name="Amanda Munden" userId="78c08021e84ba245" providerId="LiveId" clId="{9C93950A-6E9A-4B9D-94B0-2756FB385F16}"/>
+    <pc:docChg chg="addSld modSld">
+      <pc:chgData name="Amanda Munden" userId="78c08021e84ba245" providerId="LiveId" clId="{9C93950A-6E9A-4B9D-94B0-2756FB385F16}" dt="2019-11-23T23:08:20.180" v="86" actId="14100"/>
+      <pc:docMkLst>
+        <pc:docMk/>
+      </pc:docMkLst>
+      <pc:sldChg chg="addSp delSp modSp">
+        <pc:chgData name="Amanda Munden" userId="78c08021e84ba245" providerId="LiveId" clId="{9C93950A-6E9A-4B9D-94B0-2756FB385F16}" dt="2019-11-23T23:07:35.329" v="78" actId="962"/>
+        <pc:sldMkLst>
+          <pc:docMk/>
+          <pc:sldMk cId="2620131991" sldId="262"/>
+        </pc:sldMkLst>
+        <pc:spChg chg="mod">
+          <ac:chgData name="Amanda Munden" userId="78c08021e84ba245" providerId="LiveId" clId="{9C93950A-6E9A-4B9D-94B0-2756FB385F16}" dt="2019-11-23T23:06:52.155" v="18" actId="20577"/>
+          <ac:spMkLst>
+            <pc:docMk/>
+            <pc:sldMk cId="2620131991" sldId="262"/>
+            <ac:spMk id="2" creationId="{4D5427DE-1A93-4490-9678-9C134615255D}"/>
+          </ac:spMkLst>
+        </pc:spChg>
+        <pc:spChg chg="del">
+          <ac:chgData name="Amanda Munden" userId="78c08021e84ba245" providerId="LiveId" clId="{9C93950A-6E9A-4B9D-94B0-2756FB385F16}" dt="2019-11-23T23:07:32.899" v="76" actId="931"/>
+          <ac:spMkLst>
+            <pc:docMk/>
+            <pc:sldMk cId="2620131991" sldId="262"/>
+            <ac:spMk id="3" creationId="{37AE8E68-F358-4B74-BFF5-D4DE72E90072}"/>
+          </ac:spMkLst>
+        </pc:spChg>
+        <pc:picChg chg="add mod">
+          <ac:chgData name="Amanda Munden" userId="78c08021e84ba245" providerId="LiveId" clId="{9C93950A-6E9A-4B9D-94B0-2756FB385F16}" dt="2019-11-23T23:07:35.329" v="78" actId="962"/>
+          <ac:picMkLst>
+            <pc:docMk/>
+            <pc:sldMk cId="2620131991" sldId="262"/>
+            <ac:picMk id="5" creationId="{AB0551C7-5BD3-45C4-96DF-89AE3C6D0417}"/>
+          </ac:picMkLst>
+        </pc:picChg>
+      </pc:sldChg>
+      <pc:sldChg chg="addSp delSp modSp add">
+        <pc:chgData name="Amanda Munden" userId="78c08021e84ba245" providerId="LiveId" clId="{9C93950A-6E9A-4B9D-94B0-2756FB385F16}" dt="2019-11-23T23:07:51.630" v="80" actId="27614"/>
+        <pc:sldMkLst>
+          <pc:docMk/>
+          <pc:sldMk cId="616536198" sldId="263"/>
+        </pc:sldMkLst>
+        <pc:spChg chg="mod">
+          <ac:chgData name="Amanda Munden" userId="78c08021e84ba245" providerId="LiveId" clId="{9C93950A-6E9A-4B9D-94B0-2756FB385F16}" dt="2019-11-23T23:07:08.998" v="48" actId="20577"/>
+          <ac:spMkLst>
+            <pc:docMk/>
+            <pc:sldMk cId="616536198" sldId="263"/>
+            <ac:spMk id="2" creationId="{3D90B654-309B-40B8-BF30-091DDD1DA0AF}"/>
+          </ac:spMkLst>
+        </pc:spChg>
+        <pc:spChg chg="del">
+          <ac:chgData name="Amanda Munden" userId="78c08021e84ba245" providerId="LiveId" clId="{9C93950A-6E9A-4B9D-94B0-2756FB385F16}" dt="2019-11-23T23:07:50.026" v="79" actId="931"/>
+          <ac:spMkLst>
+            <pc:docMk/>
+            <pc:sldMk cId="616536198" sldId="263"/>
+            <ac:spMk id="3" creationId="{41931CBF-0DFA-4AB3-A69F-B8479D0DBE93}"/>
+          </ac:spMkLst>
+        </pc:spChg>
+        <pc:picChg chg="add mod">
+          <ac:chgData name="Amanda Munden" userId="78c08021e84ba245" providerId="LiveId" clId="{9C93950A-6E9A-4B9D-94B0-2756FB385F16}" dt="2019-11-23T23:07:51.630" v="80" actId="27614"/>
+          <ac:picMkLst>
+            <pc:docMk/>
+            <pc:sldMk cId="616536198" sldId="263"/>
+            <ac:picMk id="5" creationId="{421A75E0-5C90-4D2B-A56F-3B174BEF8133}"/>
+          </ac:picMkLst>
+        </pc:picChg>
+      </pc:sldChg>
+      <pc:sldChg chg="addSp delSp modSp add">
+        <pc:chgData name="Amanda Munden" userId="78c08021e84ba245" providerId="LiveId" clId="{9C93950A-6E9A-4B9D-94B0-2756FB385F16}" dt="2019-11-23T23:08:20.180" v="86" actId="14100"/>
+        <pc:sldMkLst>
+          <pc:docMk/>
+          <pc:sldMk cId="1886239127" sldId="264"/>
+        </pc:sldMkLst>
+        <pc:spChg chg="mod">
+          <ac:chgData name="Amanda Munden" userId="78c08021e84ba245" providerId="LiveId" clId="{9C93950A-6E9A-4B9D-94B0-2756FB385F16}" dt="2019-11-23T23:07:18.833" v="75" actId="20577"/>
+          <ac:spMkLst>
+            <pc:docMk/>
+            <pc:sldMk cId="1886239127" sldId="264"/>
+            <ac:spMk id="2" creationId="{EE48583C-25DC-45F0-8979-8ED6B5DFAC49}"/>
+          </ac:spMkLst>
+        </pc:spChg>
+        <pc:spChg chg="del">
+          <ac:chgData name="Amanda Munden" userId="78c08021e84ba245" providerId="LiveId" clId="{9C93950A-6E9A-4B9D-94B0-2756FB385F16}" dt="2019-11-23T23:08:05.194" v="81" actId="931"/>
+          <ac:spMkLst>
+            <pc:docMk/>
+            <pc:sldMk cId="1886239127" sldId="264"/>
+            <ac:spMk id="3" creationId="{0912C02D-BC83-41E9-ABFF-EF39D63CDDF2}"/>
+          </ac:spMkLst>
+        </pc:spChg>
+        <pc:picChg chg="add mod">
+          <ac:chgData name="Amanda Munden" userId="78c08021e84ba245" providerId="LiveId" clId="{9C93950A-6E9A-4B9D-94B0-2756FB385F16}" dt="2019-11-23T23:08:20.180" v="86" actId="14100"/>
+          <ac:picMkLst>
+            <pc:docMk/>
+            <pc:sldMk cId="1886239127" sldId="264"/>
+            <ac:picMk id="5" creationId="{E74F5F98-ADFF-4322-9B02-43714FC66BE3}"/>
+          </ac:picMkLst>
+        </pc:picChg>
+      </pc:sldChg>
+    </pc:docChg>
+  </pc:docChgLst>
+</pc:chgInfo>
+</file>
+
 <file path=ppt/slideLayouts/slideLayout1.xml><?xml version="1.0" encoding="utf-8"?>
 <p:sldLayout xmlns:a="http://schemas.openxmlformats.org/drawingml/2006/main" xmlns:r="http://schemas.openxmlformats.org/officeDocument/2006/relationships" xmlns:p="http://schemas.openxmlformats.org/presentationml/2006/main" type="title" preserve="1">
   <p:cSld name="Title Slide">
@@ -267,7 +384,7 @@
           <a:p>
             <a:fld id="{75537270-B636-42B7-AF87-B34C72575733}" type="datetimeFigureOut">
               <a:rPr lang="en-CA" smtClean="0"/>
-              <a:t>2019-11-22</a:t>
+              <a:t>2019-11-23</a:t>
             </a:fld>
             <a:endParaRPr lang="en-CA"/>
           </a:p>
@@ -467,7 +584,7 @@
           <a:p>
             <a:fld id="{75537270-B636-42B7-AF87-B34C72575733}" type="datetimeFigureOut">
               <a:rPr lang="en-CA" smtClean="0"/>
-              <a:t>2019-11-22</a:t>
+              <a:t>2019-11-23</a:t>
             </a:fld>
             <a:endParaRPr lang="en-CA"/>
           </a:p>
@@ -677,7 +794,7 @@
           <a:p>
             <a:fld id="{75537270-B636-42B7-AF87-B34C72575733}" type="datetimeFigureOut">
               <a:rPr lang="en-CA" smtClean="0"/>
-              <a:t>2019-11-22</a:t>
+              <a:t>2019-11-23</a:t>
             </a:fld>
             <a:endParaRPr lang="en-CA"/>
           </a:p>
@@ -877,7 +994,7 @@
           <a:p>
             <a:fld id="{75537270-B636-42B7-AF87-B34C72575733}" type="datetimeFigureOut">
               <a:rPr lang="en-CA" smtClean="0"/>
-              <a:t>2019-11-22</a:t>
+              <a:t>2019-11-23</a:t>
             </a:fld>
             <a:endParaRPr lang="en-CA"/>
           </a:p>
@@ -1153,7 +1270,7 @@
           <a:p>
             <a:fld id="{75537270-B636-42B7-AF87-B34C72575733}" type="datetimeFigureOut">
               <a:rPr lang="en-CA" smtClean="0"/>
-              <a:t>2019-11-22</a:t>
+              <a:t>2019-11-23</a:t>
             </a:fld>
             <a:endParaRPr lang="en-CA"/>
           </a:p>
@@ -1421,7 +1538,7 @@
           <a:p>
             <a:fld id="{75537270-B636-42B7-AF87-B34C72575733}" type="datetimeFigureOut">
               <a:rPr lang="en-CA" smtClean="0"/>
-              <a:t>2019-11-22</a:t>
+              <a:t>2019-11-23</a:t>
             </a:fld>
             <a:endParaRPr lang="en-CA"/>
           </a:p>
@@ -1836,7 +1953,7 @@
           <a:p>
             <a:fld id="{75537270-B636-42B7-AF87-B34C72575733}" type="datetimeFigureOut">
               <a:rPr lang="en-CA" smtClean="0"/>
-              <a:t>2019-11-22</a:t>
+              <a:t>2019-11-23</a:t>
             </a:fld>
             <a:endParaRPr lang="en-CA"/>
           </a:p>
@@ -1978,7 +2095,7 @@
           <a:p>
             <a:fld id="{75537270-B636-42B7-AF87-B34C72575733}" type="datetimeFigureOut">
               <a:rPr lang="en-CA" smtClean="0"/>
-              <a:t>2019-11-22</a:t>
+              <a:t>2019-11-23</a:t>
             </a:fld>
             <a:endParaRPr lang="en-CA"/>
           </a:p>
@@ -2091,7 +2208,7 @@
           <a:p>
             <a:fld id="{75537270-B636-42B7-AF87-B34C72575733}" type="datetimeFigureOut">
               <a:rPr lang="en-CA" smtClean="0"/>
-              <a:t>2019-11-22</a:t>
+              <a:t>2019-11-23</a:t>
             </a:fld>
             <a:endParaRPr lang="en-CA"/>
           </a:p>
@@ -2404,7 +2521,7 @@
           <a:p>
             <a:fld id="{75537270-B636-42B7-AF87-B34C72575733}" type="datetimeFigureOut">
               <a:rPr lang="en-CA" smtClean="0"/>
-              <a:t>2019-11-22</a:t>
+              <a:t>2019-11-23</a:t>
             </a:fld>
             <a:endParaRPr lang="en-CA"/>
           </a:p>
@@ -2693,7 +2810,7 @@
           <a:p>
             <a:fld id="{75537270-B636-42B7-AF87-B34C72575733}" type="datetimeFigureOut">
               <a:rPr lang="en-CA" smtClean="0"/>
-              <a:t>2019-11-22</a:t>
+              <a:t>2019-11-23</a:t>
             </a:fld>
             <a:endParaRPr lang="en-CA"/>
           </a:p>
@@ -2936,7 +3053,7 @@
           <a:p>
             <a:fld id="{75537270-B636-42B7-AF87-B34C72575733}" type="datetimeFigureOut">
               <a:rPr lang="en-CA" smtClean="0"/>
-              <a:t>2019-11-22</a:t>
+              <a:t>2019-11-23</a:t>
             </a:fld>
             <a:endParaRPr lang="en-CA"/>
           </a:p>
@@ -3990,39 +4107,238 @@
           <a:bodyPr/>
           <a:lstStyle/>
           <a:p>
-            <a:endParaRPr lang="en-CA"/>
-          </a:p>
-        </p:txBody>
-      </p:sp>
-      <p:sp>
-        <p:nvSpPr>
-          <p:cNvPr id="3" name="Content Placeholder 2">
-            <a:extLst>
-              <a:ext uri="{FF2B5EF4-FFF2-40B4-BE49-F238E27FC236}">
-                <a16:creationId xmlns:a16="http://schemas.microsoft.com/office/drawing/2014/main" id="{37AE8E68-F358-4B74-BFF5-D4DE72E90072}"/>
-              </a:ext>
-            </a:extLst>
-          </p:cNvPr>
-          <p:cNvSpPr>
-            <a:spLocks noGrp="1"/>
-          </p:cNvSpPr>
+            <a:r>
+              <a:rPr lang="en-CA" dirty="0"/>
+              <a:t>Student Sample Data</a:t>
+            </a:r>
+          </a:p>
+        </p:txBody>
+      </p:sp>
+      <p:pic>
+        <p:nvPicPr>
+          <p:cNvPr id="5" name="Content Placeholder 4" descr="A screenshot of a social media post&#10;&#10;Description automatically generated">
+            <a:extLst>
+              <a:ext uri="{FF2B5EF4-FFF2-40B4-BE49-F238E27FC236}">
+                <a16:creationId xmlns:a16="http://schemas.microsoft.com/office/drawing/2014/main" id="{AB0551C7-5BD3-45C4-96DF-89AE3C6D0417}"/>
+              </a:ext>
+            </a:extLst>
+          </p:cNvPr>
+          <p:cNvPicPr>
+            <a:picLocks noGrp="1" noChangeAspect="1"/>
+          </p:cNvPicPr>
           <p:nvPr>
             <p:ph idx="1"/>
           </p:nvPr>
-        </p:nvSpPr>
-        <p:spPr/>
-        <p:txBody>
-          <a:bodyPr/>
-          <a:lstStyle/>
-          <a:p>
-            <a:endParaRPr lang="en-CA"/>
-          </a:p>
-        </p:txBody>
-      </p:sp>
+        </p:nvPicPr>
+        <p:blipFill>
+          <a:blip r:embed="rId2">
+            <a:extLst>
+              <a:ext uri="{28A0092B-C50C-407E-A947-70E740481C1C}">
+                <a14:useLocalDpi xmlns:a14="http://schemas.microsoft.com/office/drawing/2010/main" val="0"/>
+              </a:ext>
+            </a:extLst>
+          </a:blip>
+          <a:stretch>
+            <a:fillRect/>
+          </a:stretch>
+        </p:blipFill>
+        <p:spPr>
+          <a:xfrm>
+            <a:off x="1619020" y="3290057"/>
+            <a:ext cx="8953960" cy="1422473"/>
+          </a:xfrm>
+        </p:spPr>
+      </p:pic>
     </p:spTree>
     <p:extLst>
       <p:ext uri="{BB962C8B-B14F-4D97-AF65-F5344CB8AC3E}">
         <p14:creationId xmlns:p14="http://schemas.microsoft.com/office/powerpoint/2010/main" val="2620131991"/>
+      </p:ext>
+    </p:extLst>
+  </p:cSld>
+  <p:clrMapOvr>
+    <a:masterClrMapping/>
+  </p:clrMapOvr>
+</p:sld>
+</file>
+
+<file path=ppt/slides/slide8.xml><?xml version="1.0" encoding="utf-8"?>
+<p:sld xmlns:a="http://schemas.openxmlformats.org/drawingml/2006/main" xmlns:r="http://schemas.openxmlformats.org/officeDocument/2006/relationships" xmlns:p="http://schemas.openxmlformats.org/presentationml/2006/main">
+  <p:cSld>
+    <p:spTree>
+      <p:nvGrpSpPr>
+        <p:cNvPr id="1" name=""/>
+        <p:cNvGrpSpPr/>
+        <p:nvPr/>
+      </p:nvGrpSpPr>
+      <p:grpSpPr>
+        <a:xfrm>
+          <a:off x="0" y="0"/>
+          <a:ext cx="0" cy="0"/>
+          <a:chOff x="0" y="0"/>
+          <a:chExt cx="0" cy="0"/>
+        </a:xfrm>
+      </p:grpSpPr>
+      <p:sp>
+        <p:nvSpPr>
+          <p:cNvPr id="2" name="Title 1">
+            <a:extLst>
+              <a:ext uri="{FF2B5EF4-FFF2-40B4-BE49-F238E27FC236}">
+                <a16:creationId xmlns:a16="http://schemas.microsoft.com/office/drawing/2014/main" id="{3D90B654-309B-40B8-BF30-091DDD1DA0AF}"/>
+              </a:ext>
+            </a:extLst>
+          </p:cNvPr>
+          <p:cNvSpPr>
+            <a:spLocks noGrp="1"/>
+          </p:cNvSpPr>
+          <p:nvPr>
+            <p:ph type="title"/>
+          </p:nvPr>
+        </p:nvSpPr>
+        <p:spPr/>
+        <p:txBody>
+          <a:bodyPr/>
+          <a:lstStyle/>
+          <a:p>
+            <a:r>
+              <a:rPr lang="en-CA" dirty="0"/>
+              <a:t>Faculty Sample Data</a:t>
+            </a:r>
+          </a:p>
+        </p:txBody>
+      </p:sp>
+      <p:pic>
+        <p:nvPicPr>
+          <p:cNvPr id="5" name="Content Placeholder 4" descr="A screenshot of a cell phone&#10;&#10;Description automatically generated">
+            <a:extLst>
+              <a:ext uri="{FF2B5EF4-FFF2-40B4-BE49-F238E27FC236}">
+                <a16:creationId xmlns:a16="http://schemas.microsoft.com/office/drawing/2014/main" id="{421A75E0-5C90-4D2B-A56F-3B174BEF8133}"/>
+              </a:ext>
+            </a:extLst>
+          </p:cNvPr>
+          <p:cNvPicPr>
+            <a:picLocks noGrp="1" noChangeAspect="1"/>
+          </p:cNvPicPr>
+          <p:nvPr>
+            <p:ph idx="1"/>
+          </p:nvPr>
+        </p:nvPicPr>
+        <p:blipFill>
+          <a:blip r:embed="rId2">
+            <a:extLst>
+              <a:ext uri="{28A0092B-C50C-407E-A947-70E740481C1C}">
+                <a14:useLocalDpi xmlns:a14="http://schemas.microsoft.com/office/drawing/2010/main" val="0"/>
+              </a:ext>
+            </a:extLst>
+          </a:blip>
+          <a:stretch>
+            <a:fillRect/>
+          </a:stretch>
+        </p:blipFill>
+        <p:spPr>
+          <a:xfrm>
+            <a:off x="1831756" y="3318634"/>
+            <a:ext cx="8528488" cy="1365320"/>
+          </a:xfrm>
+        </p:spPr>
+      </p:pic>
+    </p:spTree>
+    <p:extLst>
+      <p:ext uri="{BB962C8B-B14F-4D97-AF65-F5344CB8AC3E}">
+        <p14:creationId xmlns:p14="http://schemas.microsoft.com/office/powerpoint/2010/main" val="616536198"/>
+      </p:ext>
+    </p:extLst>
+  </p:cSld>
+  <p:clrMapOvr>
+    <a:masterClrMapping/>
+  </p:clrMapOvr>
+</p:sld>
+</file>
+
+<file path=ppt/slides/slide9.xml><?xml version="1.0" encoding="utf-8"?>
+<p:sld xmlns:a="http://schemas.openxmlformats.org/drawingml/2006/main" xmlns:r="http://schemas.openxmlformats.org/officeDocument/2006/relationships" xmlns:p="http://schemas.openxmlformats.org/presentationml/2006/main">
+  <p:cSld>
+    <p:spTree>
+      <p:nvGrpSpPr>
+        <p:cNvPr id="1" name=""/>
+        <p:cNvGrpSpPr/>
+        <p:nvPr/>
+      </p:nvGrpSpPr>
+      <p:grpSpPr>
+        <a:xfrm>
+          <a:off x="0" y="0"/>
+          <a:ext cx="0" cy="0"/>
+          <a:chOff x="0" y="0"/>
+          <a:chExt cx="0" cy="0"/>
+        </a:xfrm>
+      </p:grpSpPr>
+      <p:sp>
+        <p:nvSpPr>
+          <p:cNvPr id="2" name="Title 1">
+            <a:extLst>
+              <a:ext uri="{FF2B5EF4-FFF2-40B4-BE49-F238E27FC236}">
+                <a16:creationId xmlns:a16="http://schemas.microsoft.com/office/drawing/2014/main" id="{EE48583C-25DC-45F0-8979-8ED6B5DFAC49}"/>
+              </a:ext>
+            </a:extLst>
+          </p:cNvPr>
+          <p:cNvSpPr>
+            <a:spLocks noGrp="1"/>
+          </p:cNvSpPr>
+          <p:nvPr>
+            <p:ph type="title"/>
+          </p:nvPr>
+        </p:nvSpPr>
+        <p:spPr/>
+        <p:txBody>
+          <a:bodyPr/>
+          <a:lstStyle/>
+          <a:p>
+            <a:r>
+              <a:rPr lang="en-CA" dirty="0"/>
+              <a:t>Course Sample Data</a:t>
+            </a:r>
+          </a:p>
+        </p:txBody>
+      </p:sp>
+      <p:pic>
+        <p:nvPicPr>
+          <p:cNvPr id="5" name="Content Placeholder 4" descr="A screenshot of a social media post&#10;&#10;Description automatically generated">
+            <a:extLst>
+              <a:ext uri="{FF2B5EF4-FFF2-40B4-BE49-F238E27FC236}">
+                <a16:creationId xmlns:a16="http://schemas.microsoft.com/office/drawing/2014/main" id="{E74F5F98-ADFF-4322-9B02-43714FC66BE3}"/>
+              </a:ext>
+            </a:extLst>
+          </p:cNvPr>
+          <p:cNvPicPr>
+            <a:picLocks noGrp="1" noChangeAspect="1"/>
+          </p:cNvPicPr>
+          <p:nvPr>
+            <p:ph idx="1"/>
+          </p:nvPr>
+        </p:nvPicPr>
+        <p:blipFill>
+          <a:blip r:embed="rId2">
+            <a:extLst>
+              <a:ext uri="{28A0092B-C50C-407E-A947-70E740481C1C}">
+                <a14:useLocalDpi xmlns:a14="http://schemas.microsoft.com/office/drawing/2010/main" val="0"/>
+              </a:ext>
+            </a:extLst>
+          </a:blip>
+          <a:stretch>
+            <a:fillRect/>
+          </a:stretch>
+        </p:blipFill>
+        <p:spPr>
+          <a:xfrm>
+            <a:off x="1239521" y="2561255"/>
+            <a:ext cx="9977916" cy="1997602"/>
+          </a:xfrm>
+        </p:spPr>
+      </p:pic>
+    </p:spTree>
+    <p:extLst>
+      <p:ext uri="{BB962C8B-B14F-4D97-AF65-F5344CB8AC3E}">
+        <p14:creationId xmlns:p14="http://schemas.microsoft.com/office/powerpoint/2010/main" val="1886239127"/>
       </p:ext>
     </p:extLst>
   </p:cSld>

</xml_diff>